<commit_message>
add C variable mapping figure
</commit_message>
<xml_diff>
--- a/doc/manuscript/figures_tables/C_pools_fig.pptx
+++ b/doc/manuscript/figures_tables/C_pools_fig.pptx
@@ -2985,7 +2985,7 @@
         <p:spPr>
           <a:xfrm>
             <a:off x="1441780" y="2805438"/>
-            <a:ext cx="184211" cy="1208507"/>
+            <a:ext cx="184211" cy="1420356"/>
           </a:xfrm>
           <a:prstGeom prst="line">
             <a:avLst/>
@@ -3065,7 +3065,7 @@
         <p:spPr>
           <a:xfrm>
             <a:off x="1441780" y="2805438"/>
-            <a:ext cx="184211" cy="2865353"/>
+            <a:ext cx="184211" cy="3145443"/>
           </a:xfrm>
           <a:prstGeom prst="line">
             <a:avLst/>
@@ -3145,7 +3145,7 @@
         <p:spPr>
           <a:xfrm flipH="1" flipV="1">
             <a:off x="2971231" y="1380026"/>
-            <a:ext cx="176461" cy="188971"/>
+            <a:ext cx="176461" cy="252368"/>
           </a:xfrm>
           <a:prstGeom prst="line">
             <a:avLst/>
@@ -3184,8 +3184,8 @@
         </p:nvCxnSpPr>
         <p:spPr>
           <a:xfrm flipV="1">
-            <a:off x="2971231" y="2938128"/>
-            <a:ext cx="176461" cy="1075817"/>
+            <a:off x="2971231" y="3064922"/>
+            <a:ext cx="176461" cy="1160872"/>
           </a:xfrm>
           <a:prstGeom prst="line">
             <a:avLst/>
@@ -3224,8 +3224,8 @@
         </p:nvCxnSpPr>
         <p:spPr>
           <a:xfrm>
-            <a:off x="2971231" y="4013945"/>
-            <a:ext cx="176461" cy="284106"/>
+            <a:off x="2971231" y="4225794"/>
+            <a:ext cx="176461" cy="275699"/>
           </a:xfrm>
           <a:prstGeom prst="line">
             <a:avLst/>
@@ -3264,7 +3264,7 @@
         </p:nvCxnSpPr>
         <p:spPr>
           <a:xfrm flipV="1">
-            <a:off x="2971231" y="5658307"/>
+            <a:off x="2971231" y="5938397"/>
             <a:ext cx="176461" cy="12484"/>
           </a:xfrm>
           <a:prstGeom prst="line">
@@ -3304,8 +3304,8 @@
         </p:nvCxnSpPr>
         <p:spPr>
           <a:xfrm flipV="1">
-            <a:off x="4492932" y="193887"/>
-            <a:ext cx="714349" cy="1935"/>
+            <a:off x="4519292" y="193887"/>
+            <a:ext cx="687989" cy="1935"/>
           </a:xfrm>
           <a:prstGeom prst="line">
             <a:avLst/>
@@ -3344,8 +3344,8 @@
         </p:nvCxnSpPr>
         <p:spPr>
           <a:xfrm flipH="1" flipV="1">
-            <a:off x="4492932" y="195822"/>
-            <a:ext cx="714349" cy="1065106"/>
+            <a:off x="4519292" y="195822"/>
+            <a:ext cx="687989" cy="1065106"/>
           </a:xfrm>
           <a:prstGeom prst="line">
             <a:avLst/>
@@ -3384,8 +3384,8 @@
         </p:nvCxnSpPr>
         <p:spPr>
           <a:xfrm flipH="1" flipV="1">
-            <a:off x="4519292" y="2938128"/>
-            <a:ext cx="687989" cy="1932679"/>
+            <a:off x="4519292" y="3064922"/>
+            <a:ext cx="687989" cy="2067137"/>
           </a:xfrm>
           <a:prstGeom prst="line">
             <a:avLst/>
@@ -3424,8 +3424,8 @@
         </p:nvCxnSpPr>
         <p:spPr>
           <a:xfrm flipH="1" flipV="1">
-            <a:off x="4519292" y="2938128"/>
-            <a:ext cx="687989" cy="2961388"/>
+            <a:off x="4519292" y="3064922"/>
+            <a:ext cx="687989" cy="3114684"/>
           </a:xfrm>
           <a:prstGeom prst="line">
             <a:avLst/>
@@ -3464,8 +3464,8 @@
         </p:nvCxnSpPr>
         <p:spPr>
           <a:xfrm flipH="1" flipV="1">
-            <a:off x="4519292" y="1568997"/>
-            <a:ext cx="687989" cy="734610"/>
+            <a:off x="4519292" y="1632394"/>
+            <a:ext cx="687989" cy="932465"/>
           </a:xfrm>
           <a:prstGeom prst="line">
             <a:avLst/>
@@ -3504,8 +3504,8 @@
         </p:nvCxnSpPr>
         <p:spPr>
           <a:xfrm flipH="1" flipV="1">
-            <a:off x="4519292" y="1568997"/>
-            <a:ext cx="687989" cy="1751589"/>
+            <a:off x="4519292" y="1632394"/>
+            <a:ext cx="687989" cy="1949444"/>
           </a:xfrm>
           <a:prstGeom prst="line">
             <a:avLst/>
@@ -3544,8 +3544,8 @@
         </p:nvCxnSpPr>
         <p:spPr>
           <a:xfrm flipH="1" flipV="1">
-            <a:off x="4519292" y="2938128"/>
-            <a:ext cx="687989" cy="1390201"/>
+            <a:off x="4519292" y="3064922"/>
+            <a:ext cx="687989" cy="1524659"/>
           </a:xfrm>
           <a:prstGeom prst="line">
             <a:avLst/>
@@ -3580,7 +3580,7 @@
         </p:nvGrpSpPr>
         <p:grpSpPr>
           <a:xfrm>
-            <a:off x="5207281" y="2180163"/>
+            <a:off x="5207281" y="2441415"/>
             <a:ext cx="1555612" cy="974581"/>
             <a:chOff x="90095" y="47551"/>
             <a:chExt cx="1555612" cy="974581"/>
@@ -3790,8 +3790,21 @@
                     <a:schemeClr val="tx1"/>
                   </a:solidFill>
                 </a:rPr>
-                <a:t>biomass_root_fine</a:t>
-              </a:r>
+                <a:t>biomass_root_fine </a:t>
+              </a:r>
+              <a:r>
+                <a:rPr lang="en-US" sz="1000" dirty="0">
+                  <a:solidFill>
+                    <a:schemeClr val="tx1"/>
+                  </a:solidFill>
+                </a:rPr>
+                <a:t>| △ ⌀ </a:t>
+              </a:r>
+              <a:endParaRPr lang="en-US" sz="1000" i="1" dirty="0">
+                <a:solidFill>
+                  <a:schemeClr val="tx1"/>
+                </a:solidFill>
+              </a:endParaRPr>
             </a:p>
           </p:txBody>
         </p:sp>
@@ -3872,9 +3885,9 @@
         <p:grpSpPr>
           <a:xfrm>
             <a:off x="3147692" y="72711"/>
-            <a:ext cx="1346372" cy="1223293"/>
+            <a:ext cx="1372732" cy="1223293"/>
             <a:chOff x="90095" y="47552"/>
-            <a:chExt cx="1346372" cy="1223293"/>
+            <a:chExt cx="1372732" cy="1223293"/>
           </a:xfrm>
         </p:grpSpPr>
         <p:sp>
@@ -3892,7 +3905,7 @@
           <p:spPr>
             <a:xfrm>
               <a:off x="91227" y="780186"/>
-              <a:ext cx="1345240" cy="246221"/>
+              <a:ext cx="1371600" cy="246221"/>
             </a:xfrm>
             <a:prstGeom prst="rect">
               <a:avLst/>
@@ -3923,7 +3936,7 @@
             </a:fontRef>
           </p:style>
           <p:txBody>
-            <a:bodyPr rtlCol="0" anchor="ctr"/>
+            <a:bodyPr lIns="45720" rIns="45720" rtlCol="0" anchor="ctr"/>
             <a:lstStyle/>
             <a:p>
               <a:pPr algn="ctr"/>
@@ -3941,7 +3954,15 @@
                     <a:schemeClr val="tx1"/>
                   </a:solidFill>
                 </a:rPr>
-                <a:t>ANPP_woody_stem</a:t>
+                <a:t>ANPP_woody_stem </a:t>
+              </a:r>
+              <a:r>
+                <a:rPr lang="en-US" sz="1000" i="1" baseline="30000" dirty="0">
+                  <a:solidFill>
+                    <a:schemeClr val="tx1"/>
+                  </a:solidFill>
+                </a:rPr>
+                <a:t>2</a:t>
               </a:r>
               <a:endParaRPr lang="en-US" sz="1000" dirty="0">
                 <a:solidFill>
@@ -3966,7 +3987,7 @@
           <p:spPr>
             <a:xfrm>
               <a:off x="91227" y="1024624"/>
-              <a:ext cx="1345240" cy="246221"/>
+              <a:ext cx="1371600" cy="246221"/>
             </a:xfrm>
             <a:prstGeom prst="rect">
               <a:avLst/>
@@ -4007,7 +4028,7 @@
                     <a:schemeClr val="tx1"/>
                   </a:solidFill>
                 </a:rPr>
-                <a:t>▼ woody_mortality</a:t>
+                <a:t>▼ woody_mortality </a:t>
               </a:r>
               <a:r>
                 <a:rPr lang="en-US" sz="1000" i="1" baseline="30000" dirty="0">
@@ -4015,7 +4036,7 @@
                     <a:schemeClr val="tx1"/>
                   </a:solidFill>
                 </a:rPr>
-                <a:t>2</a:t>
+                <a:t>3</a:t>
               </a:r>
               <a:endParaRPr lang="en-US" sz="1000" dirty="0">
                 <a:solidFill>
@@ -4040,7 +4061,7 @@
           <p:spPr>
             <a:xfrm>
               <a:off x="91227" y="536478"/>
-              <a:ext cx="1345240" cy="246221"/>
+              <a:ext cx="1371600" cy="246221"/>
             </a:xfrm>
             <a:prstGeom prst="rect">
               <a:avLst/>
@@ -4090,6 +4111,14 @@
                   </a:solidFill>
                 </a:rPr>
                 <a:t> delta.agb</a:t>
+              </a:r>
+              <a:r>
+                <a:rPr lang="en-US" sz="1000" i="1" baseline="30000" dirty="0">
+                  <a:solidFill>
+                    <a:schemeClr val="tx1"/>
+                  </a:solidFill>
+                </a:rPr>
+                <a:t> </a:t>
               </a:r>
               <a:endParaRPr lang="en-US" sz="1000" dirty="0">
                 <a:solidFill>
@@ -4114,7 +4143,7 @@
           <p:spPr>
             <a:xfrm>
               <a:off x="91227" y="291480"/>
-              <a:ext cx="1345240" cy="246221"/>
+              <a:ext cx="1371600" cy="246221"/>
             </a:xfrm>
             <a:prstGeom prst="rect">
               <a:avLst/>
@@ -4175,7 +4204,7 @@
           <p:spPr>
             <a:xfrm>
               <a:off x="90095" y="47552"/>
-              <a:ext cx="1345240" cy="246221"/>
+              <a:ext cx="1371600" cy="246221"/>
             </a:xfrm>
             <a:prstGeom prst="rect">
               <a:avLst/>
@@ -4595,9 +4624,9 @@
         <p:grpSpPr>
           <a:xfrm>
             <a:off x="5207281" y="1102546"/>
-            <a:ext cx="1555612" cy="1035219"/>
+            <a:ext cx="1555612" cy="1286428"/>
             <a:chOff x="90095" y="-22990"/>
-            <a:chExt cx="1555612" cy="1035219"/>
+            <a:chExt cx="1555612" cy="1286428"/>
           </a:xfrm>
         </p:grpSpPr>
         <p:sp>
@@ -4614,7 +4643,7 @@
           </p:nvSpPr>
           <p:spPr>
             <a:xfrm>
-              <a:off x="91227" y="530806"/>
+              <a:off x="91227" y="782015"/>
               <a:ext cx="1554480" cy="246221"/>
             </a:xfrm>
             <a:prstGeom prst="rect">
@@ -4688,7 +4717,7 @@
           </p:nvSpPr>
           <p:spPr>
             <a:xfrm>
-              <a:off x="91227" y="766008"/>
+              <a:off x="91227" y="1017217"/>
               <a:ext cx="1554480" cy="246221"/>
             </a:xfrm>
             <a:prstGeom prst="rect">
@@ -4730,7 +4759,7 @@
                     <a:schemeClr val="tx1"/>
                   </a:solidFill>
                 </a:rPr>
-                <a:t>▼ woody_mortality</a:t>
+                <a:t>▼ woody_mortality </a:t>
               </a:r>
               <a:r>
                 <a:rPr lang="en-US" sz="1000" i="1" baseline="30000" dirty="0">
@@ -4738,7 +4767,7 @@
                     <a:schemeClr val="tx1"/>
                   </a:solidFill>
                 </a:rPr>
-                <a:t>2</a:t>
+                <a:t>2,3</a:t>
               </a:r>
               <a:endParaRPr lang="en-US" sz="1000" dirty="0">
                 <a:solidFill>
@@ -4762,7 +4791,7 @@
           </p:nvSpPr>
           <p:spPr>
             <a:xfrm>
-              <a:off x="91227" y="291480"/>
+              <a:off x="91227" y="281432"/>
               <a:ext cx="1554480" cy="246221"/>
             </a:xfrm>
             <a:prstGeom prst="rect">
@@ -4888,7 +4917,7 @@
         </p:nvGrpSpPr>
         <p:grpSpPr>
           <a:xfrm>
-            <a:off x="3147692" y="2815017"/>
+            <a:off x="3147692" y="2941811"/>
             <a:ext cx="1372732" cy="1223293"/>
             <a:chOff x="90095" y="47552"/>
             <a:chExt cx="1372732" cy="1223293"/>
@@ -4958,15 +4987,7 @@
                     <a:schemeClr val="tx1"/>
                   </a:solidFill>
                 </a:rPr>
-                <a:t>woody_mortality</a:t>
-              </a:r>
-              <a:r>
-                <a:rPr lang="en-US" sz="1000" baseline="30000" dirty="0">
-                  <a:solidFill>
-                    <a:schemeClr val="tx1"/>
-                  </a:solidFill>
-                </a:rPr>
-                <a:t>1,</a:t>
+                <a:t>woody_mortality </a:t>
               </a:r>
               <a:r>
                 <a:rPr lang="en-US" sz="1000" i="1" baseline="30000" dirty="0">
@@ -4974,7 +4995,7 @@
                     <a:schemeClr val="tx1"/>
                   </a:solidFill>
                 </a:rPr>
-                <a:t>2</a:t>
+                <a:t>3,4</a:t>
               </a:r>
               <a:endParaRPr lang="en-US" sz="1000" dirty="0">
                 <a:solidFill>
@@ -5040,7 +5061,7 @@
                     <a:schemeClr val="tx1"/>
                   </a:solidFill>
                 </a:rPr>
-                <a:t>▼ R_het_deadwood</a:t>
+                <a:t>▼ R_het_deadwood </a:t>
               </a:r>
               <a:r>
                 <a:rPr lang="en-US" sz="1000" baseline="30000" dirty="0">
@@ -5048,7 +5069,7 @@
                     <a:schemeClr val="tx1"/>
                   </a:solidFill>
                 </a:rPr>
-                <a:t>1,3</a:t>
+                <a:t>4,5</a:t>
               </a:r>
               <a:r>
                 <a:rPr lang="en-US" sz="1000" dirty="0">
@@ -5125,7 +5146,7 @@
                     <a:schemeClr val="tx1"/>
                   </a:solidFill>
                 </a:rPr>
-                <a:t> delta.deadwood</a:t>
+                <a:t> delta.deadwood </a:t>
               </a:r>
               <a:r>
                 <a:rPr lang="en-US" sz="1000" baseline="30000" dirty="0">
@@ -5133,7 +5154,7 @@
                     <a:schemeClr val="tx1"/>
                   </a:solidFill>
                 </a:rPr>
-                <a:t>1</a:t>
+                <a:t>4</a:t>
               </a:r>
               <a:endParaRPr lang="en-US" sz="1000" dirty="0">
                 <a:solidFill>
@@ -5199,15 +5220,15 @@
                     <a:schemeClr val="tx1"/>
                   </a:solidFill>
                 </a:rPr>
-                <a:t>deadwood</a:t>
-              </a:r>
-              <a:r>
-                <a:rPr lang="en-US" sz="1000" baseline="30000" dirty="0">
-                  <a:solidFill>
-                    <a:schemeClr val="tx1"/>
-                  </a:solidFill>
-                </a:rPr>
-                <a:t>1</a:t>
+                <a:t>deadwood </a:t>
+              </a:r>
+              <a:r>
+                <a:rPr lang="en-US" sz="1000" i="1" baseline="30000" dirty="0">
+                  <a:solidFill>
+                    <a:schemeClr val="tx1"/>
+                  </a:solidFill>
+                </a:rPr>
+                <a:t>4</a:t>
               </a:r>
               <a:endParaRPr lang="en-US" sz="1000" i="1" dirty="0">
                 <a:solidFill>
@@ -5298,8 +5319,8 @@
         </p:nvSpPr>
         <p:spPr>
           <a:xfrm>
-            <a:off x="0" y="7680061"/>
-            <a:ext cx="6769459" cy="1528624"/>
+            <a:off x="0" y="7108748"/>
+            <a:ext cx="6769459" cy="1631216"/>
           </a:xfrm>
           <a:prstGeom prst="rect">
             <a:avLst/>
@@ -5318,7 +5339,15 @@
             </a:r>
             <a:r>
               <a:rPr lang="en-US" sz="1000" dirty="0"/>
-              <a:t> incomplete: excludes belowground components </a:t>
+              <a:t> assumes minimal non-respiratory CO</a:t>
+            </a:r>
+            <a:r>
+              <a:rPr lang="en-US" sz="1000" baseline="-25000" dirty="0"/>
+              <a:t>2</a:t>
+            </a:r>
+            <a:r>
+              <a:rPr lang="en-US" sz="1000" dirty="0"/>
+              <a:t> fluxes, …. (Chapin et al. 2006)</a:t>
             </a:r>
           </a:p>
           <a:p>
@@ -5328,15 +5357,18 @@
             </a:r>
             <a:r>
               <a:rPr lang="en-US" sz="1000" dirty="0"/>
-              <a:t>incomplete: excludes large </a:t>
+              <a:t>assumes that change in foliage biomass is negligible (see note 7).</a:t>
             </a:r>
+            <a:endParaRPr lang="en-US" sz="1000" baseline="30000" dirty="0"/>
+          </a:p>
+          <a:p>
             <a:r>
-              <a:rPr lang="en-US" sz="1000" dirty="0" err="1"/>
-              <a:t>branchfall</a:t>
+              <a:rPr lang="en-US" sz="1000" baseline="30000" dirty="0"/>
+              <a:t>3 </a:t>
             </a:r>
             <a:r>
               <a:rPr lang="en-US" sz="1000" dirty="0"/>
-              <a:t>; also, under IPCC definitions, outflux from </a:t>
+              <a:t>incomplete: excludes large branch fall; also, under IPCC definitions, outflux from </a:t>
             </a:r>
             <a:r>
               <a:rPr lang="en-US" sz="1000" i="1" dirty="0"/>
@@ -5344,27 +5376,25 @@
             </a:r>
             <a:r>
               <a:rPr lang="en-US" sz="1000" dirty="0"/>
-              <a:t>should include all sizes, influx to Dead wood should include only above the minimum diameter chosen for dead wood</a:t>
+              <a:t>should include all sizes, influx to </a:t>
             </a:r>
-          </a:p>
-          <a:p>
             <a:r>
-              <a:rPr lang="en-US" sz="1000" baseline="30000" dirty="0"/>
-              <a:t>3 </a:t>
+              <a:rPr lang="en-US" sz="1000" i="1" dirty="0"/>
+              <a:t>deadwood</a:t>
             </a:r>
             <a:r>
               <a:rPr lang="en-US" sz="1000" dirty="0"/>
-              <a:t>incomplete: excludes breakage into pieces less than dead wood threshold size</a:t>
+              <a:t> should include only above the minimum diameter chosen for dead wood</a:t>
             </a:r>
           </a:p>
           <a:p>
             <a:r>
               <a:rPr lang="en-US" sz="1000" baseline="30000" dirty="0"/>
-              <a:t>4</a:t>
+              <a:t>4 </a:t>
             </a:r>
             <a:r>
               <a:rPr lang="en-US" sz="1000" dirty="0"/>
-              <a:t> foliage production is generally measured by collecting leaf-fall, a method that assumes that the influx = outflux (foliage biomass is roughly constant year-to-year)</a:t>
+              <a:t>incomplete: excludes belowground components </a:t>
             </a:r>
           </a:p>
           <a:p>
@@ -5374,7 +5404,7 @@
             </a:r>
             <a:r>
               <a:rPr lang="en-US" sz="1000" dirty="0"/>
-              <a:t>incomplete: excludes woody_mortality of stems &lt;10 cm DBH, decomposition of dead wood (aboveground and coarse roots) into sizes classified as litter. </a:t>
+              <a:t>incomplete: excludes breakage into pieces less than dead wood threshold size</a:t>
             </a:r>
           </a:p>
           <a:p>
@@ -5382,11 +5412,19 @@
               <a:rPr lang="en-US" sz="1000" baseline="30000" dirty="0"/>
               <a:t>6 </a:t>
             </a:r>
+            <a:r>
+              <a:rPr lang="en-US" sz="1000" dirty="0"/>
+              <a:t>incomplete: excludes woody_mortality of stems &lt;10 cm DBH, decomposition of dead wood (aboveground and coarse roots) into sizes classified as litter. </a:t>
+            </a:r>
           </a:p>
           <a:p>
             <a:r>
               <a:rPr lang="en-US" sz="1000" baseline="30000" dirty="0"/>
               <a:t>7</a:t>
+            </a:r>
+            <a:r>
+              <a:rPr lang="en-US" sz="1000" dirty="0"/>
+              <a:t> foliage production is generally measured by collecting leaf-fall, a method that assumes that the influx = outflux (foliage biomass is roughly constant year-to-year)</a:t>
             </a:r>
           </a:p>
         </p:txBody>
@@ -5475,7 +5513,7 @@
                     <a:schemeClr val="tx1"/>
                   </a:solidFill>
                 </a:rPr>
-                <a:t>ANPP_foliage</a:t>
+                <a:t>ANPP_foliage </a:t>
               </a:r>
               <a:r>
                 <a:rPr lang="en-US" sz="1000" i="1" baseline="30000" dirty="0">
@@ -5483,7 +5521,7 @@
                     <a:schemeClr val="tx1"/>
                   </a:solidFill>
                 </a:rPr>
-                <a:t>4</a:t>
+                <a:t>7</a:t>
               </a:r>
               <a:endParaRPr lang="en-US" sz="1000" dirty="0">
                 <a:solidFill>
@@ -5549,7 +5587,7 @@
                     <a:schemeClr val="tx1"/>
                   </a:solidFill>
                 </a:rPr>
-                <a:t>▼ ANPP_foliage</a:t>
+                <a:t>▼ ANPP_foliage </a:t>
               </a:r>
               <a:r>
                 <a:rPr lang="en-US" sz="1000" i="1" baseline="30000" dirty="0">
@@ -5557,7 +5595,7 @@
                     <a:schemeClr val="tx1"/>
                   </a:solidFill>
                 </a:rPr>
-                <a:t>4</a:t>
+                <a:t>7</a:t>
               </a:r>
               <a:endParaRPr lang="en-US" sz="1000" dirty="0">
                 <a:solidFill>
@@ -5623,8 +5661,21 @@
                     <a:schemeClr val="tx1"/>
                   </a:solidFill>
                 </a:rPr>
-                <a:t>biomass_ag_foliage</a:t>
-              </a:r>
+                <a:t>biomass_ag_foliage </a:t>
+              </a:r>
+              <a:r>
+                <a:rPr lang="en-US" sz="1000" dirty="0">
+                  <a:solidFill>
+                    <a:schemeClr val="tx1"/>
+                  </a:solidFill>
+                </a:rPr>
+                <a:t>| △ ⌀ </a:t>
+              </a:r>
+              <a:endParaRPr lang="en-US" sz="1000" i="1" dirty="0">
+                <a:solidFill>
+                  <a:schemeClr val="tx1"/>
+                </a:solidFill>
+              </a:endParaRPr>
             </a:p>
           </p:txBody>
         </p:sp>
@@ -5711,8 +5762,8 @@
         </p:nvCxnSpPr>
         <p:spPr>
           <a:xfrm rot="10800000" flipV="1">
-            <a:off x="4520425" y="2014654"/>
-            <a:ext cx="687989" cy="1656107"/>
+            <a:off x="4520425" y="2265864"/>
+            <a:ext cx="687989" cy="1531692"/>
           </a:xfrm>
           <a:prstGeom prst="curvedConnector3">
             <a:avLst>
@@ -5726,7 +5777,7 @@
                 <a:lumOff val="40000"/>
               </a:schemeClr>
             </a:solidFill>
-            <a:prstDash val="solid"/>
+            <a:prstDash val="sysDash"/>
             <a:tailEnd type="triangle"/>
           </a:ln>
         </p:spPr>
@@ -5759,7 +5810,7 @@
         </p:nvSpPr>
         <p:spPr>
           <a:xfrm>
-            <a:off x="1625991" y="3890834"/>
+            <a:off x="1625991" y="4102683"/>
             <a:ext cx="1345240" cy="246221"/>
           </a:xfrm>
           <a:prstGeom prst="rect">
@@ -5820,7 +5871,7 @@
         </p:nvSpPr>
         <p:spPr>
           <a:xfrm>
-            <a:off x="1625991" y="5547680"/>
+            <a:off x="1625991" y="5827770"/>
             <a:ext cx="1345240" cy="246221"/>
           </a:xfrm>
           <a:prstGeom prst="rect">
@@ -5881,7 +5932,7 @@
         </p:nvGrpSpPr>
         <p:grpSpPr>
           <a:xfrm>
-            <a:off x="3147692" y="5534863"/>
+            <a:off x="3147692" y="5814953"/>
             <a:ext cx="1371600" cy="1220397"/>
             <a:chOff x="3286258" y="5056556"/>
             <a:chExt cx="1371600" cy="1220397"/>
@@ -6300,7 +6351,7 @@
                     <a:schemeClr val="tx1"/>
                   </a:solidFill>
                 </a:rPr>
-                <a:t>GPP</a:t>
+                <a:t>GPP </a:t>
               </a:r>
               <a:r>
                 <a:rPr lang="en-US" sz="1000" i="1" baseline="30000" dirty="0">
@@ -6308,7 +6359,7 @@
                     <a:schemeClr val="tx1"/>
                   </a:solidFill>
                 </a:rPr>
-                <a:t>6</a:t>
+                <a:t>1</a:t>
               </a:r>
               <a:endParaRPr lang="en-US" sz="1000" dirty="0">
                 <a:solidFill>
@@ -6374,7 +6425,7 @@
                     <a:schemeClr val="tx1"/>
                   </a:solidFill>
                 </a:rPr>
-                <a:t>▼ R_eco</a:t>
+                <a:t>▼ R_eco </a:t>
               </a:r>
               <a:r>
                 <a:rPr lang="en-US" sz="1000" i="1" baseline="30000" dirty="0">
@@ -6382,7 +6433,7 @@
                     <a:schemeClr val="tx1"/>
                   </a:solidFill>
                 </a:rPr>
-                <a:t>6</a:t>
+                <a:t>1</a:t>
               </a:r>
               <a:endParaRPr lang="en-US" sz="1000" baseline="30000" dirty="0">
                 <a:solidFill>
@@ -6456,7 +6507,7 @@
                     <a:schemeClr val="tx1"/>
                   </a:solidFill>
                 </a:rPr>
-                <a:t> NEE</a:t>
+                <a:t> NEE </a:t>
               </a:r>
               <a:r>
                 <a:rPr lang="en-US" sz="1000" i="1" baseline="30000" dirty="0">
@@ -6464,7 +6515,7 @@
                     <a:schemeClr val="tx1"/>
                   </a:solidFill>
                 </a:rPr>
-                <a:t>6</a:t>
+                <a:t>1</a:t>
               </a:r>
               <a:r>
                 <a:rPr lang="en-US" sz="1000" i="1" dirty="0">
@@ -6472,7 +6523,7 @@
                     <a:schemeClr val="tx1"/>
                   </a:solidFill>
                 </a:rPr>
-                <a:t>, NEP</a:t>
+                <a:t>, NEP </a:t>
               </a:r>
               <a:r>
                 <a:rPr lang="en-US" sz="1000" i="1" baseline="30000" dirty="0">
@@ -6480,7 +6531,7 @@
                     <a:schemeClr val="tx1"/>
                   </a:solidFill>
                 </a:rPr>
-                <a:t>6</a:t>
+                <a:t>1</a:t>
               </a:r>
               <a:r>
                 <a:rPr lang="en-US" sz="1000" i="1" dirty="0">
@@ -6635,7 +6686,7 @@
         </p:nvGrpSpPr>
         <p:grpSpPr>
           <a:xfrm>
-            <a:off x="3147692" y="4174940"/>
+            <a:off x="3147692" y="4378382"/>
             <a:ext cx="1372732" cy="1223293"/>
             <a:chOff x="90095" y="47552"/>
             <a:chExt cx="1372732" cy="1223293"/>
@@ -6705,7 +6756,7 @@
                     <a:schemeClr val="tx1"/>
                   </a:solidFill>
                 </a:rPr>
-                <a:t>NPP_litter</a:t>
+                <a:t>NPP_litter </a:t>
               </a:r>
               <a:r>
                 <a:rPr lang="en-US" sz="1000" i="1" baseline="30000" dirty="0">
@@ -6713,7 +6764,7 @@
                     <a:schemeClr val="tx1"/>
                   </a:solidFill>
                 </a:rPr>
-                <a:t>5</a:t>
+                <a:t>6</a:t>
               </a:r>
               <a:endParaRPr lang="en-US" sz="1000" dirty="0">
                 <a:solidFill>
@@ -6856,7 +6907,7 @@
                     <a:schemeClr val="tx1"/>
                   </a:solidFill>
                 </a:rPr>
-                <a:t> delta.organic.layer</a:t>
+                <a:t> delta.organic.layer </a:t>
               </a:r>
               <a:r>
                 <a:rPr lang="en-US" sz="1000" baseline="30000" dirty="0">
@@ -6864,7 +6915,7 @@
                     <a:schemeClr val="tx1"/>
                   </a:solidFill>
                 </a:rPr>
-                <a:t>1</a:t>
+                <a:t>4</a:t>
               </a:r>
               <a:endParaRPr lang="en-US" sz="1000" dirty="0">
                 <a:solidFill>
@@ -6930,7 +6981,7 @@
                     <a:schemeClr val="tx1"/>
                   </a:solidFill>
                 </a:rPr>
-                <a:t>organic.layer</a:t>
+                <a:t>organic.layer </a:t>
               </a:r>
               <a:r>
                 <a:rPr lang="en-US" sz="1000" baseline="30000" dirty="0">
@@ -6938,7 +6989,7 @@
                     <a:schemeClr val="tx1"/>
                   </a:solidFill>
                 </a:rPr>
-                <a:t>1</a:t>
+                <a:t>4</a:t>
               </a:r>
               <a:endParaRPr lang="en-US" sz="1000" i="1" dirty="0">
                 <a:solidFill>
@@ -7006,14 +7057,11 @@
                 </a:rPr>
                 <a:t>Litter</a:t>
               </a:r>
-              <a:r>
-                <a:rPr lang="en-US" sz="1000" baseline="30000" dirty="0">
-                  <a:solidFill>
-                    <a:schemeClr val="tx1"/>
-                  </a:solidFill>
-                </a:rPr>
-                <a:t>1</a:t>
-              </a:r>
+              <a:endParaRPr lang="en-US" sz="1000" baseline="30000" dirty="0">
+                <a:solidFill>
+                  <a:schemeClr val="tx1"/>
+                </a:solidFill>
+              </a:endParaRPr>
             </a:p>
           </p:txBody>
         </p:sp>
@@ -7032,7 +7080,7 @@
         </p:nvGrpSpPr>
         <p:grpSpPr>
           <a:xfrm>
-            <a:off x="3147692" y="1445886"/>
+            <a:off x="3147692" y="1509283"/>
             <a:ext cx="1371600" cy="1219249"/>
             <a:chOff x="3285576" y="1375961"/>
             <a:chExt cx="1371600" cy="1219249"/>
@@ -7396,8 +7444,8 @@
         </p:nvCxnSpPr>
         <p:spPr>
           <a:xfrm>
-            <a:off x="4520424" y="3915200"/>
-            <a:ext cx="12700" cy="1115485"/>
+            <a:off x="4520424" y="4041994"/>
+            <a:ext cx="12700" cy="1192133"/>
           </a:xfrm>
           <a:prstGeom prst="curvedConnector3">
             <a:avLst>
@@ -7408,7 +7456,7 @@
             <a:solidFill>
               <a:srgbClr val="909387"/>
             </a:solidFill>
-            <a:prstDash val="solid"/>
+            <a:prstDash val="sysDash"/>
             <a:tailEnd type="triangle"/>
           </a:ln>
         </p:spPr>
@@ -7445,8 +7493,8 @@
         </p:nvCxnSpPr>
         <p:spPr>
           <a:xfrm flipH="1">
-            <a:off x="4519292" y="5275123"/>
-            <a:ext cx="1132" cy="1112255"/>
+            <a:off x="4519292" y="5478565"/>
+            <a:ext cx="1132" cy="1188903"/>
           </a:xfrm>
           <a:prstGeom prst="curvedConnector3">
             <a:avLst>
@@ -7457,7 +7505,7 @@
             <a:solidFill>
               <a:srgbClr val="9E996D"/>
             </a:solidFill>
-            <a:prstDash val="solid"/>
+            <a:prstDash val="sysDash"/>
             <a:tailEnd type="triangle"/>
           </a:ln>
         </p:spPr>
@@ -7494,8 +7542,8 @@
         </p:nvCxnSpPr>
         <p:spPr>
           <a:xfrm rot="10800000" flipV="1">
-            <a:off x="4520425" y="4581853"/>
-            <a:ext cx="686857" cy="448831"/>
+            <a:off x="4520425" y="4843105"/>
+            <a:ext cx="686857" cy="391021"/>
           </a:xfrm>
           <a:prstGeom prst="curvedConnector3">
             <a:avLst>
@@ -7506,7 +7554,7 @@
             <a:solidFill>
               <a:srgbClr val="909387"/>
             </a:solidFill>
-            <a:prstDash val="solid"/>
+            <a:prstDash val="sysDash"/>
             <a:tailEnd type="triangle"/>
           </a:ln>
         </p:spPr>
@@ -7544,7 +7592,7 @@
         <p:spPr>
           <a:xfrm rot="10800000" flipV="1">
             <a:off x="4520425" y="936703"/>
-            <a:ext cx="687989" cy="4093981"/>
+            <a:ext cx="687989" cy="4297423"/>
           </a:xfrm>
           <a:prstGeom prst="curvedConnector3">
             <a:avLst>
@@ -7558,7 +7606,7 @@
                 <a:lumOff val="40000"/>
               </a:schemeClr>
             </a:solidFill>
-            <a:prstDash val="solid"/>
+            <a:prstDash val="sysDash"/>
             <a:tailEnd type="triangle"/>
           </a:ln>
         </p:spPr>
@@ -7595,8 +7643,8 @@
         </p:nvCxnSpPr>
         <p:spPr>
           <a:xfrm rot="10800000" flipV="1">
-            <a:off x="4520425" y="2014655"/>
-            <a:ext cx="687989" cy="3016030"/>
+            <a:off x="4520425" y="2265863"/>
+            <a:ext cx="687989" cy="2968263"/>
           </a:xfrm>
           <a:prstGeom prst="curvedConnector3">
             <a:avLst>
@@ -7607,7 +7655,7 @@
             <a:solidFill>
               <a:srgbClr val="909387"/>
             </a:solidFill>
-            <a:prstDash val="solid"/>
+            <a:prstDash val="sysDash"/>
             <a:tailEnd type="triangle"/>
           </a:ln>
         </p:spPr>
@@ -7997,7 +8045,7 @@
         </p:nvGrpSpPr>
         <p:grpSpPr>
           <a:xfrm>
-            <a:off x="5207281" y="3197142"/>
+            <a:off x="5207281" y="3458394"/>
             <a:ext cx="1555612" cy="965345"/>
             <a:chOff x="90095" y="47551"/>
             <a:chExt cx="1555612" cy="965345"/>
@@ -8192,7 +8240,7 @@
             </a:fontRef>
           </p:style>
           <p:txBody>
-            <a:bodyPr rtlCol="0" anchor="ctr"/>
+            <a:bodyPr lIns="45720" rIns="45720" rtlCol="0" anchor="ctr"/>
             <a:lstStyle/>
             <a:p>
               <a:pPr algn="ctr"/>
@@ -8202,8 +8250,21 @@
                     <a:schemeClr val="tx1"/>
                   </a:solidFill>
                 </a:rPr>
-                <a:t>biomass_root_coarse</a:t>
-              </a:r>
+                <a:t>biomass_root_coarse </a:t>
+              </a:r>
+              <a:r>
+                <a:rPr lang="en-US" sz="1000" dirty="0">
+                  <a:solidFill>
+                    <a:schemeClr val="tx1"/>
+                  </a:solidFill>
+                </a:rPr>
+                <a:t>| △ ⌀ </a:t>
+              </a:r>
+              <a:endParaRPr lang="en-US" sz="1000" i="1" dirty="0">
+                <a:solidFill>
+                  <a:schemeClr val="tx1"/>
+                </a:solidFill>
+              </a:endParaRPr>
             </a:p>
           </p:txBody>
         </p:sp>
@@ -8287,19 +8348,19 @@
         </p:nvCxnSpPr>
         <p:spPr>
           <a:xfrm rot="10800000" flipV="1">
-            <a:off x="5207281" y="4039042"/>
+            <a:off x="5207281" y="4300294"/>
             <a:ext cx="1132" cy="542811"/>
           </a:xfrm>
           <a:prstGeom prst="curvedConnector3">
             <a:avLst>
-              <a:gd name="adj1" fmla="val 10106272"/>
+              <a:gd name="adj1" fmla="val 20294346"/>
             </a:avLst>
           </a:prstGeom>
           <a:ln w="12700">
             <a:solidFill>
-              <a:srgbClr val="779099"/>
+              <a:srgbClr val="8CA9B4"/>
             </a:solidFill>
-            <a:prstDash val="solid"/>
+            <a:prstDash val="sysDash"/>
             <a:tailEnd type="triangle"/>
           </a:ln>
         </p:spPr>
@@ -8332,7 +8393,7 @@
         </p:nvGrpSpPr>
         <p:grpSpPr>
           <a:xfrm>
-            <a:off x="5207281" y="4204885"/>
+            <a:off x="5207281" y="4466137"/>
             <a:ext cx="1554480" cy="500413"/>
             <a:chOff x="5148119" y="4306142"/>
             <a:chExt cx="1554480" cy="500413"/>
@@ -8394,7 +8455,7 @@
                     <a:schemeClr val="tx1"/>
                   </a:solidFill>
                 </a:rPr>
-                <a:t>⌀  | ▲ ⌀ | </a:t>
+                <a:t>⌀  | △ ⌀  | ▲ ⌀ | </a:t>
               </a:r>
               <a:r>
                 <a:rPr lang="en-US" sz="1000" i="1" dirty="0">
@@ -8496,7 +8557,7 @@
         </p:nvGrpSpPr>
         <p:grpSpPr>
           <a:xfrm>
-            <a:off x="5207281" y="4747696"/>
+            <a:off x="5207281" y="5008948"/>
             <a:ext cx="1555612" cy="978855"/>
             <a:chOff x="90095" y="47552"/>
             <a:chExt cx="1555612" cy="978855"/>
@@ -8795,7 +8856,7 @@
         </p:nvGrpSpPr>
         <p:grpSpPr>
           <a:xfrm>
-            <a:off x="5207281" y="5776405"/>
+            <a:off x="5207281" y="6056495"/>
             <a:ext cx="1555612" cy="978855"/>
             <a:chOff x="90095" y="47552"/>
             <a:chExt cx="1555612" cy="978855"/>
@@ -9080,6 +9141,253 @@
           </p:txBody>
         </p:sp>
       </p:grpSp>
+      <p:sp>
+        <p:nvSpPr>
+          <p:cNvPr id="435" name="Rectangle 434">
+            <a:extLst>
+              <a:ext uri="{FF2B5EF4-FFF2-40B4-BE49-F238E27FC236}">
+                <a16:creationId xmlns:a16="http://schemas.microsoft.com/office/drawing/2014/main" id="{02FC17E0-1455-FE4F-8EF5-9C8CA6632D54}"/>
+              </a:ext>
+            </a:extLst>
+          </p:cNvPr>
+          <p:cNvSpPr/>
+          <p:nvPr/>
+        </p:nvSpPr>
+        <p:spPr>
+          <a:xfrm>
+            <a:off x="5207280" y="1657756"/>
+            <a:ext cx="1554480" cy="246221"/>
+          </a:xfrm>
+          <a:prstGeom prst="rect">
+            <a:avLst/>
+          </a:prstGeom>
+          <a:solidFill>
+            <a:schemeClr val="bg1"/>
+          </a:solidFill>
+          <a:ln>
+            <a:solidFill>
+              <a:schemeClr val="tx1"/>
+            </a:solidFill>
+          </a:ln>
+        </p:spPr>
+        <p:style>
+          <a:lnRef idx="2">
+            <a:schemeClr val="accent1">
+              <a:shade val="50000"/>
+            </a:schemeClr>
+          </a:lnRef>
+          <a:fillRef idx="1">
+            <a:schemeClr val="accent1"/>
+          </a:fillRef>
+          <a:effectRef idx="0">
+            <a:schemeClr val="accent1"/>
+          </a:effectRef>
+          <a:fontRef idx="minor">
+            <a:schemeClr val="lt1"/>
+          </a:fontRef>
+        </p:style>
+        <p:txBody>
+          <a:bodyPr rtlCol="0" anchor="ctr"/>
+          <a:lstStyle/>
+          <a:p>
+            <a:pPr algn="ctr"/>
+            <a:r>
+              <a:rPr lang="en-US" sz="1000" dirty="0">
+                <a:solidFill>
+                  <a:schemeClr val="tx1"/>
+                </a:solidFill>
+              </a:rPr>
+              <a:t>△</a:t>
+            </a:r>
+            <a:r>
+              <a:rPr lang="en-US" sz="1000" i="1" dirty="0">
+                <a:solidFill>
+                  <a:schemeClr val="tx1"/>
+                </a:solidFill>
+              </a:rPr>
+              <a:t> delta.agb </a:t>
+            </a:r>
+            <a:r>
+              <a:rPr lang="en-US" sz="1000" i="1" baseline="30000" dirty="0">
+                <a:solidFill>
+                  <a:schemeClr val="tx1"/>
+                </a:solidFill>
+              </a:rPr>
+              <a:t>2</a:t>
+            </a:r>
+            <a:endParaRPr lang="en-US" sz="1000" dirty="0">
+              <a:solidFill>
+                <a:schemeClr val="tx1"/>
+              </a:solidFill>
+            </a:endParaRPr>
+          </a:p>
+        </p:txBody>
+      </p:sp>
+      <p:sp>
+        <p:nvSpPr>
+          <p:cNvPr id="436" name="Rectangle 435">
+            <a:extLst>
+              <a:ext uri="{FF2B5EF4-FFF2-40B4-BE49-F238E27FC236}">
+                <a16:creationId xmlns:a16="http://schemas.microsoft.com/office/drawing/2014/main" id="{B1E79ED9-6827-DB42-BD13-23D1E925A8D6}"/>
+              </a:ext>
+            </a:extLst>
+          </p:cNvPr>
+          <p:cNvSpPr/>
+          <p:nvPr/>
+        </p:nvSpPr>
+        <p:spPr>
+          <a:xfrm>
+            <a:off x="152739" y="1698005"/>
+            <a:ext cx="253595" cy="246221"/>
+          </a:xfrm>
+          <a:prstGeom prst="rect">
+            <a:avLst/>
+          </a:prstGeom>
+        </p:spPr>
+        <p:txBody>
+          <a:bodyPr wrap="none">
+            <a:spAutoFit/>
+          </a:bodyPr>
+          <a:lstStyle/>
+          <a:p>
+            <a:pPr algn="ctr"/>
+            <a:r>
+              <a:rPr lang="en-US" sz="1000" dirty="0"/>
+              <a:t>⌀</a:t>
+            </a:r>
+          </a:p>
+        </p:txBody>
+      </p:sp>
+      <p:cxnSp>
+        <p:nvCxnSpPr>
+          <p:cNvPr id="437" name="Straight Connector 436">
+            <a:extLst>
+              <a:ext uri="{FF2B5EF4-FFF2-40B4-BE49-F238E27FC236}">
+                <a16:creationId xmlns:a16="http://schemas.microsoft.com/office/drawing/2014/main" id="{BEF6CEA4-D75B-8A43-8335-563EC823F776}"/>
+              </a:ext>
+            </a:extLst>
+          </p:cNvPr>
+          <p:cNvCxnSpPr>
+            <a:cxnSpLocks/>
+          </p:cNvCxnSpPr>
+          <p:nvPr/>
+        </p:nvCxnSpPr>
+        <p:spPr>
+          <a:xfrm>
+            <a:off x="229563" y="1522066"/>
+            <a:ext cx="99951" cy="0"/>
+          </a:xfrm>
+          <a:prstGeom prst="line">
+            <a:avLst/>
+          </a:prstGeom>
+        </p:spPr>
+        <p:style>
+          <a:lnRef idx="1">
+            <a:schemeClr val="dk1"/>
+          </a:lnRef>
+          <a:fillRef idx="0">
+            <a:schemeClr val="dk1"/>
+          </a:fillRef>
+          <a:effectRef idx="0">
+            <a:schemeClr val="dk1"/>
+          </a:effectRef>
+          <a:fontRef idx="minor">
+            <a:schemeClr val="tx1"/>
+          </a:fontRef>
+        </p:style>
+      </p:cxnSp>
+      <p:sp>
+        <p:nvSpPr>
+          <p:cNvPr id="440" name="Rectangle 439">
+            <a:extLst>
+              <a:ext uri="{FF2B5EF4-FFF2-40B4-BE49-F238E27FC236}">
+                <a16:creationId xmlns:a16="http://schemas.microsoft.com/office/drawing/2014/main" id="{3207B2B2-74FF-174B-909A-B31888380F23}"/>
+              </a:ext>
+            </a:extLst>
+          </p:cNvPr>
+          <p:cNvSpPr/>
+          <p:nvPr/>
+        </p:nvSpPr>
+        <p:spPr>
+          <a:xfrm>
+            <a:off x="317878" y="1395185"/>
+            <a:ext cx="1047082" cy="553998"/>
+          </a:xfrm>
+          <a:prstGeom prst="rect">
+            <a:avLst/>
+          </a:prstGeom>
+        </p:spPr>
+        <p:txBody>
+          <a:bodyPr wrap="none">
+            <a:spAutoFit/>
+          </a:bodyPr>
+          <a:lstStyle/>
+          <a:p>
+            <a:r>
+              <a:rPr lang="en-US" sz="1000" dirty="0"/>
+              <a:t>component</a:t>
+            </a:r>
+          </a:p>
+          <a:p>
+            <a:r>
+              <a:rPr lang="en-US" sz="1000" dirty="0"/>
+              <a:t>C flow</a:t>
+            </a:r>
+          </a:p>
+          <a:p>
+            <a:r>
+              <a:rPr lang="en-US" sz="1000" dirty="0"/>
+              <a:t>no ForC variable</a:t>
+            </a:r>
+          </a:p>
+        </p:txBody>
+      </p:sp>
+      <p:cxnSp>
+        <p:nvCxnSpPr>
+          <p:cNvPr id="442" name="Straight Arrow Connector 441">
+            <a:extLst>
+              <a:ext uri="{FF2B5EF4-FFF2-40B4-BE49-F238E27FC236}">
+                <a16:creationId xmlns:a16="http://schemas.microsoft.com/office/drawing/2014/main" id="{491650C2-C3C0-AA43-9529-4675E08245EF}"/>
+              </a:ext>
+            </a:extLst>
+          </p:cNvPr>
+          <p:cNvCxnSpPr/>
+          <p:nvPr/>
+        </p:nvCxnSpPr>
+        <p:spPr>
+          <a:xfrm>
+            <a:off x="212834" y="1677903"/>
+            <a:ext cx="133407" cy="0"/>
+          </a:xfrm>
+          <a:prstGeom prst="straightConnector1">
+            <a:avLst/>
+          </a:prstGeom>
+          <a:ln w="12700">
+            <a:solidFill>
+              <a:schemeClr val="tx1">
+                <a:lumMod val="50000"/>
+                <a:lumOff val="50000"/>
+              </a:schemeClr>
+            </a:solidFill>
+            <a:prstDash val="sysDash"/>
+            <a:tailEnd type="triangle"/>
+          </a:ln>
+        </p:spPr>
+        <p:style>
+          <a:lnRef idx="1">
+            <a:schemeClr val="accent1"/>
+          </a:lnRef>
+          <a:fillRef idx="0">
+            <a:schemeClr val="accent1"/>
+          </a:fillRef>
+          <a:effectRef idx="0">
+            <a:schemeClr val="accent1"/>
+          </a:effectRef>
+          <a:fontRef idx="minor">
+            <a:schemeClr val="tx1"/>
+          </a:fontRef>
+        </p:style>
+      </p:cxnSp>
     </p:spTree>
     <p:extLst>
       <p:ext uri="{BB962C8B-B14F-4D97-AF65-F5344CB8AC3E}">

</xml_diff>

<commit_message>
litter/ O.horizon/ organic.layer distinction
https://github.com/forc-db/ForC/issues/240

#19
</commit_message>
<xml_diff>
--- a/doc/manuscript/figures_tables/C_pools_fig.pptx
+++ b/doc/manuscript/figures_tables/C_pools_fig.pptx
@@ -197,7 +197,7 @@
           <a:p>
             <a:fld id="{DB657656-E537-AA48-B575-F7F3A3DBC2DD}" type="datetimeFigureOut">
               <a:rPr lang="en-US" smtClean="0"/>
-              <a:t>6/17/21</a:t>
+              <a:t>6/21/21</a:t>
             </a:fld>
             <a:endParaRPr lang="en-US"/>
           </a:p>
@@ -682,7 +682,7 @@
           <a:p>
             <a:fld id="{6298E0E3-79FA-3742-AA7B-873C13C8E065}" type="datetimeFigureOut">
               <a:rPr lang="en-US" smtClean="0"/>
-              <a:t>6/17/21</a:t>
+              <a:t>6/21/21</a:t>
             </a:fld>
             <a:endParaRPr lang="en-US"/>
           </a:p>
@@ -852,7 +852,7 @@
           <a:p>
             <a:fld id="{6298E0E3-79FA-3742-AA7B-873C13C8E065}" type="datetimeFigureOut">
               <a:rPr lang="en-US" smtClean="0"/>
-              <a:t>6/17/21</a:t>
+              <a:t>6/21/21</a:t>
             </a:fld>
             <a:endParaRPr lang="en-US"/>
           </a:p>
@@ -1032,7 +1032,7 @@
           <a:p>
             <a:fld id="{6298E0E3-79FA-3742-AA7B-873C13C8E065}" type="datetimeFigureOut">
               <a:rPr lang="en-US" smtClean="0"/>
-              <a:t>6/17/21</a:t>
+              <a:t>6/21/21</a:t>
             </a:fld>
             <a:endParaRPr lang="en-US"/>
           </a:p>
@@ -1202,7 +1202,7 @@
           <a:p>
             <a:fld id="{6298E0E3-79FA-3742-AA7B-873C13C8E065}" type="datetimeFigureOut">
               <a:rPr lang="en-US" smtClean="0"/>
-              <a:t>6/17/21</a:t>
+              <a:t>6/21/21</a:t>
             </a:fld>
             <a:endParaRPr lang="en-US"/>
           </a:p>
@@ -1446,7 +1446,7 @@
           <a:p>
             <a:fld id="{6298E0E3-79FA-3742-AA7B-873C13C8E065}" type="datetimeFigureOut">
               <a:rPr lang="en-US" smtClean="0"/>
-              <a:t>6/17/21</a:t>
+              <a:t>6/21/21</a:t>
             </a:fld>
             <a:endParaRPr lang="en-US"/>
           </a:p>
@@ -1678,7 +1678,7 @@
           <a:p>
             <a:fld id="{6298E0E3-79FA-3742-AA7B-873C13C8E065}" type="datetimeFigureOut">
               <a:rPr lang="en-US" smtClean="0"/>
-              <a:t>6/17/21</a:t>
+              <a:t>6/21/21</a:t>
             </a:fld>
             <a:endParaRPr lang="en-US"/>
           </a:p>
@@ -2045,7 +2045,7 @@
           <a:p>
             <a:fld id="{6298E0E3-79FA-3742-AA7B-873C13C8E065}" type="datetimeFigureOut">
               <a:rPr lang="en-US" smtClean="0"/>
-              <a:t>6/17/21</a:t>
+              <a:t>6/21/21</a:t>
             </a:fld>
             <a:endParaRPr lang="en-US"/>
           </a:p>
@@ -2163,7 +2163,7 @@
           <a:p>
             <a:fld id="{6298E0E3-79FA-3742-AA7B-873C13C8E065}" type="datetimeFigureOut">
               <a:rPr lang="en-US" smtClean="0"/>
-              <a:t>6/17/21</a:t>
+              <a:t>6/21/21</a:t>
             </a:fld>
             <a:endParaRPr lang="en-US"/>
           </a:p>
@@ -2258,7 +2258,7 @@
           <a:p>
             <a:fld id="{6298E0E3-79FA-3742-AA7B-873C13C8E065}" type="datetimeFigureOut">
               <a:rPr lang="en-US" smtClean="0"/>
-              <a:t>6/17/21</a:t>
+              <a:t>6/21/21</a:t>
             </a:fld>
             <a:endParaRPr lang="en-US"/>
           </a:p>
@@ -2535,7 +2535,7 @@
           <a:p>
             <a:fld id="{6298E0E3-79FA-3742-AA7B-873C13C8E065}" type="datetimeFigureOut">
               <a:rPr lang="en-US" smtClean="0"/>
-              <a:t>6/17/21</a:t>
+              <a:t>6/21/21</a:t>
             </a:fld>
             <a:endParaRPr lang="en-US"/>
           </a:p>
@@ -2792,7 +2792,7 @@
           <a:p>
             <a:fld id="{6298E0E3-79FA-3742-AA7B-873C13C8E065}" type="datetimeFigureOut">
               <a:rPr lang="en-US" smtClean="0"/>
-              <a:t>6/17/21</a:t>
+              <a:t>6/21/21</a:t>
             </a:fld>
             <a:endParaRPr lang="en-US"/>
           </a:p>
@@ -3005,7 +3005,7 @@
           <a:p>
             <a:fld id="{6298E0E3-79FA-3742-AA7B-873C13C8E065}" type="datetimeFigureOut">
               <a:rPr lang="en-US" smtClean="0"/>
-              <a:t>6/17/21</a:t>
+              <a:t>6/21/21</a:t>
             </a:fld>
             <a:endParaRPr lang="en-US"/>
           </a:p>
@@ -7343,7 +7343,7 @@
                     <a:schemeClr val="tx1"/>
                   </a:solidFill>
                 </a:rPr>
-                <a:t> delta.organic.layer </a:t>
+                <a:t> delta.O.horizon</a:t>
               </a:r>
               <a:r>
                 <a:rPr lang="en-US" sz="1000" baseline="30000" dirty="0">
@@ -7417,7 +7417,7 @@
                     <a:schemeClr val="tx1"/>
                   </a:solidFill>
                 </a:rPr>
-                <a:t>organic.layer </a:t>
+                <a:t>O.horizon </a:t>
               </a:r>
               <a:r>
                 <a:rPr lang="en-US" sz="1000" baseline="30000" dirty="0">

</xml_diff>

<commit_message>
small fix to variable mapping diagram
</commit_message>
<xml_diff>
--- a/doc/manuscript/figures_tables/C_pools_fig.pptx
+++ b/doc/manuscript/figures_tables/C_pools_fig.pptx
@@ -197,7 +197,7 @@
           <a:p>
             <a:fld id="{DB657656-E537-AA48-B575-F7F3A3DBC2DD}" type="datetimeFigureOut">
               <a:rPr lang="en-US" smtClean="0"/>
-              <a:t>6/21/21</a:t>
+              <a:t>9/8/21</a:t>
             </a:fld>
             <a:endParaRPr lang="en-US"/>
           </a:p>
@@ -682,7 +682,7 @@
           <a:p>
             <a:fld id="{6298E0E3-79FA-3742-AA7B-873C13C8E065}" type="datetimeFigureOut">
               <a:rPr lang="en-US" smtClean="0"/>
-              <a:t>6/21/21</a:t>
+              <a:t>9/8/21</a:t>
             </a:fld>
             <a:endParaRPr lang="en-US"/>
           </a:p>
@@ -852,7 +852,7 @@
           <a:p>
             <a:fld id="{6298E0E3-79FA-3742-AA7B-873C13C8E065}" type="datetimeFigureOut">
               <a:rPr lang="en-US" smtClean="0"/>
-              <a:t>6/21/21</a:t>
+              <a:t>9/8/21</a:t>
             </a:fld>
             <a:endParaRPr lang="en-US"/>
           </a:p>
@@ -1032,7 +1032,7 @@
           <a:p>
             <a:fld id="{6298E0E3-79FA-3742-AA7B-873C13C8E065}" type="datetimeFigureOut">
               <a:rPr lang="en-US" smtClean="0"/>
-              <a:t>6/21/21</a:t>
+              <a:t>9/8/21</a:t>
             </a:fld>
             <a:endParaRPr lang="en-US"/>
           </a:p>
@@ -1202,7 +1202,7 @@
           <a:p>
             <a:fld id="{6298E0E3-79FA-3742-AA7B-873C13C8E065}" type="datetimeFigureOut">
               <a:rPr lang="en-US" smtClean="0"/>
-              <a:t>6/21/21</a:t>
+              <a:t>9/8/21</a:t>
             </a:fld>
             <a:endParaRPr lang="en-US"/>
           </a:p>
@@ -1446,7 +1446,7 @@
           <a:p>
             <a:fld id="{6298E0E3-79FA-3742-AA7B-873C13C8E065}" type="datetimeFigureOut">
               <a:rPr lang="en-US" smtClean="0"/>
-              <a:t>6/21/21</a:t>
+              <a:t>9/8/21</a:t>
             </a:fld>
             <a:endParaRPr lang="en-US"/>
           </a:p>
@@ -1678,7 +1678,7 @@
           <a:p>
             <a:fld id="{6298E0E3-79FA-3742-AA7B-873C13C8E065}" type="datetimeFigureOut">
               <a:rPr lang="en-US" smtClean="0"/>
-              <a:t>6/21/21</a:t>
+              <a:t>9/8/21</a:t>
             </a:fld>
             <a:endParaRPr lang="en-US"/>
           </a:p>
@@ -2045,7 +2045,7 @@
           <a:p>
             <a:fld id="{6298E0E3-79FA-3742-AA7B-873C13C8E065}" type="datetimeFigureOut">
               <a:rPr lang="en-US" smtClean="0"/>
-              <a:t>6/21/21</a:t>
+              <a:t>9/8/21</a:t>
             </a:fld>
             <a:endParaRPr lang="en-US"/>
           </a:p>
@@ -2163,7 +2163,7 @@
           <a:p>
             <a:fld id="{6298E0E3-79FA-3742-AA7B-873C13C8E065}" type="datetimeFigureOut">
               <a:rPr lang="en-US" smtClean="0"/>
-              <a:t>6/21/21</a:t>
+              <a:t>9/8/21</a:t>
             </a:fld>
             <a:endParaRPr lang="en-US"/>
           </a:p>
@@ -2258,7 +2258,7 @@
           <a:p>
             <a:fld id="{6298E0E3-79FA-3742-AA7B-873C13C8E065}" type="datetimeFigureOut">
               <a:rPr lang="en-US" smtClean="0"/>
-              <a:t>6/21/21</a:t>
+              <a:t>9/8/21</a:t>
             </a:fld>
             <a:endParaRPr lang="en-US"/>
           </a:p>
@@ -2535,7 +2535,7 @@
           <a:p>
             <a:fld id="{6298E0E3-79FA-3742-AA7B-873C13C8E065}" type="datetimeFigureOut">
               <a:rPr lang="en-US" smtClean="0"/>
-              <a:t>6/21/21</a:t>
+              <a:t>9/8/21</a:t>
             </a:fld>
             <a:endParaRPr lang="en-US"/>
           </a:p>
@@ -2792,7 +2792,7 @@
           <a:p>
             <a:fld id="{6298E0E3-79FA-3742-AA7B-873C13C8E065}" type="datetimeFigureOut">
               <a:rPr lang="en-US" smtClean="0"/>
-              <a:t>6/21/21</a:t>
+              <a:t>9/8/21</a:t>
             </a:fld>
             <a:endParaRPr lang="en-US"/>
           </a:p>
@@ -3005,7 +3005,7 @@
           <a:p>
             <a:fld id="{6298E0E3-79FA-3742-AA7B-873C13C8E065}" type="datetimeFigureOut">
               <a:rPr lang="en-US" smtClean="0"/>
-              <a:t>6/21/21</a:t>
+              <a:t>9/8/21</a:t>
             </a:fld>
             <a:endParaRPr lang="en-US"/>
           </a:p>
@@ -5775,15 +5775,7 @@
             </a:r>
             <a:r>
               <a:rPr lang="en-US" sz="1000" dirty="0"/>
-              <a:t> assumes minimal </a:t>
-            </a:r>
-            <a:r>
-              <a:rPr lang="en-US" sz="1000"/>
-              <a:t>non-respiratory C </a:t>
-            </a:r>
-            <a:r>
-              <a:rPr lang="en-US" sz="1000" dirty="0"/>
-              <a:t>fluxes, …. (Chapin et al. 2006)</a:t>
+              <a:t> assumes minimal non-respiratory C fluxes, …. (Chapin et al. 2006)</a:t>
             </a:r>
           </a:p>
           <a:p>
@@ -6692,7 +6684,7 @@
                     <a:schemeClr val="tx1"/>
                   </a:solidFill>
                 </a:rPr>
-                <a:t>▼ R_soil</a:t>
+                <a:t>▼ R_het_soil</a:t>
               </a:r>
               <a:endParaRPr lang="en-US" sz="1000" dirty="0">
                 <a:solidFill>

</xml_diff>

<commit_message>
update variable mapping fig
</commit_message>
<xml_diff>
--- a/doc/manuscript/figures_tables/C_pools_fig.pptx
+++ b/doc/manuscript/figures_tables/C_pools_fig.pptx
@@ -197,7 +197,7 @@
           <a:p>
             <a:fld id="{DB657656-E537-AA48-B575-F7F3A3DBC2DD}" type="datetimeFigureOut">
               <a:rPr lang="en-US" smtClean="0"/>
-              <a:t>9/8/21</a:t>
+              <a:t>9/13/21</a:t>
             </a:fld>
             <a:endParaRPr lang="en-US"/>
           </a:p>
@@ -682,7 +682,7 @@
           <a:p>
             <a:fld id="{6298E0E3-79FA-3742-AA7B-873C13C8E065}" type="datetimeFigureOut">
               <a:rPr lang="en-US" smtClean="0"/>
-              <a:t>9/8/21</a:t>
+              <a:t>9/13/21</a:t>
             </a:fld>
             <a:endParaRPr lang="en-US"/>
           </a:p>
@@ -852,7 +852,7 @@
           <a:p>
             <a:fld id="{6298E0E3-79FA-3742-AA7B-873C13C8E065}" type="datetimeFigureOut">
               <a:rPr lang="en-US" smtClean="0"/>
-              <a:t>9/8/21</a:t>
+              <a:t>9/13/21</a:t>
             </a:fld>
             <a:endParaRPr lang="en-US"/>
           </a:p>
@@ -1032,7 +1032,7 @@
           <a:p>
             <a:fld id="{6298E0E3-79FA-3742-AA7B-873C13C8E065}" type="datetimeFigureOut">
               <a:rPr lang="en-US" smtClean="0"/>
-              <a:t>9/8/21</a:t>
+              <a:t>9/13/21</a:t>
             </a:fld>
             <a:endParaRPr lang="en-US"/>
           </a:p>
@@ -1202,7 +1202,7 @@
           <a:p>
             <a:fld id="{6298E0E3-79FA-3742-AA7B-873C13C8E065}" type="datetimeFigureOut">
               <a:rPr lang="en-US" smtClean="0"/>
-              <a:t>9/8/21</a:t>
+              <a:t>9/13/21</a:t>
             </a:fld>
             <a:endParaRPr lang="en-US"/>
           </a:p>
@@ -1446,7 +1446,7 @@
           <a:p>
             <a:fld id="{6298E0E3-79FA-3742-AA7B-873C13C8E065}" type="datetimeFigureOut">
               <a:rPr lang="en-US" smtClean="0"/>
-              <a:t>9/8/21</a:t>
+              <a:t>9/13/21</a:t>
             </a:fld>
             <a:endParaRPr lang="en-US"/>
           </a:p>
@@ -1678,7 +1678,7 @@
           <a:p>
             <a:fld id="{6298E0E3-79FA-3742-AA7B-873C13C8E065}" type="datetimeFigureOut">
               <a:rPr lang="en-US" smtClean="0"/>
-              <a:t>9/8/21</a:t>
+              <a:t>9/13/21</a:t>
             </a:fld>
             <a:endParaRPr lang="en-US"/>
           </a:p>
@@ -2045,7 +2045,7 @@
           <a:p>
             <a:fld id="{6298E0E3-79FA-3742-AA7B-873C13C8E065}" type="datetimeFigureOut">
               <a:rPr lang="en-US" smtClean="0"/>
-              <a:t>9/8/21</a:t>
+              <a:t>9/13/21</a:t>
             </a:fld>
             <a:endParaRPr lang="en-US"/>
           </a:p>
@@ -2163,7 +2163,7 @@
           <a:p>
             <a:fld id="{6298E0E3-79FA-3742-AA7B-873C13C8E065}" type="datetimeFigureOut">
               <a:rPr lang="en-US" smtClean="0"/>
-              <a:t>9/8/21</a:t>
+              <a:t>9/13/21</a:t>
             </a:fld>
             <a:endParaRPr lang="en-US"/>
           </a:p>
@@ -2258,7 +2258,7 @@
           <a:p>
             <a:fld id="{6298E0E3-79FA-3742-AA7B-873C13C8E065}" type="datetimeFigureOut">
               <a:rPr lang="en-US" smtClean="0"/>
-              <a:t>9/8/21</a:t>
+              <a:t>9/13/21</a:t>
             </a:fld>
             <a:endParaRPr lang="en-US"/>
           </a:p>
@@ -2535,7 +2535,7 @@
           <a:p>
             <a:fld id="{6298E0E3-79FA-3742-AA7B-873C13C8E065}" type="datetimeFigureOut">
               <a:rPr lang="en-US" smtClean="0"/>
-              <a:t>9/8/21</a:t>
+              <a:t>9/13/21</a:t>
             </a:fld>
             <a:endParaRPr lang="en-US"/>
           </a:p>
@@ -2792,7 +2792,7 @@
           <a:p>
             <a:fld id="{6298E0E3-79FA-3742-AA7B-873C13C8E065}" type="datetimeFigureOut">
               <a:rPr lang="en-US" smtClean="0"/>
-              <a:t>9/8/21</a:t>
+              <a:t>9/13/21</a:t>
             </a:fld>
             <a:endParaRPr lang="en-US"/>
           </a:p>
@@ -3005,7 +3005,7 @@
           <a:p>
             <a:fld id="{6298E0E3-79FA-3742-AA7B-873C13C8E065}" type="datetimeFigureOut">
               <a:rPr lang="en-US" smtClean="0"/>
-              <a:t>9/8/21</a:t>
+              <a:t>9/13/21</a:t>
             </a:fld>
             <a:endParaRPr lang="en-US"/>
           </a:p>
@@ -5756,7 +5756,7 @@
         <p:spPr>
           <a:xfrm>
             <a:off x="0" y="7108748"/>
-            <a:ext cx="6769459" cy="1631216"/>
+            <a:ext cx="6769459" cy="1785104"/>
           </a:xfrm>
           <a:prstGeom prst="rect">
             <a:avLst/>
@@ -5847,8 +5847,14 @@
           </a:p>
           <a:p>
             <a:r>
+              <a:rPr lang="en-US" sz="1000" dirty="0"/>
+              <a:t>7 incomplete</a:t>
+            </a:r>
+          </a:p>
+          <a:p>
+            <a:r>
               <a:rPr lang="en-US" sz="1000" baseline="30000" dirty="0"/>
-              <a:t>7</a:t>
+              <a:t>8</a:t>
             </a:r>
             <a:r>
               <a:rPr lang="en-US" sz="1000" dirty="0"/>
@@ -5936,12 +5942,20 @@
                 <a:t>▲ </a:t>
               </a:r>
               <a:r>
+                <a:rPr lang="en-US" sz="1000" i="1" dirty="0" err="1">
+                  <a:solidFill>
+                    <a:schemeClr val="tx1"/>
+                  </a:solidFill>
+                </a:rPr>
+                <a:t>ANPP_foliage</a:t>
+              </a:r>
+              <a:r>
                 <a:rPr lang="en-US" sz="1000" i="1" dirty="0">
                   <a:solidFill>
                     <a:schemeClr val="tx1"/>
                   </a:solidFill>
                 </a:rPr>
-                <a:t>ANPP_foliage </a:t>
+                <a:t> </a:t>
               </a:r>
               <a:r>
                 <a:rPr lang="en-US" sz="1000" i="1" baseline="30000" dirty="0">
@@ -5949,7 +5963,7 @@
                     <a:schemeClr val="tx1"/>
                   </a:solidFill>
                 </a:rPr>
-                <a:t>7</a:t>
+                <a:t>8</a:t>
               </a:r>
               <a:endParaRPr lang="en-US" sz="1000" dirty="0">
                 <a:solidFill>
@@ -6015,7 +6029,23 @@
                     <a:schemeClr val="tx1"/>
                   </a:solidFill>
                 </a:rPr>
-                <a:t>▼ ANPP_foliage </a:t>
+                <a:t>▼ </a:t>
+              </a:r>
+              <a:r>
+                <a:rPr lang="en-US" sz="1000" i="1" dirty="0" err="1">
+                  <a:solidFill>
+                    <a:schemeClr val="tx1"/>
+                  </a:solidFill>
+                </a:rPr>
+                <a:t>ANPP_foliage</a:t>
+              </a:r>
+              <a:r>
+                <a:rPr lang="en-US" sz="1000" i="1" dirty="0">
+                  <a:solidFill>
+                    <a:schemeClr val="tx1"/>
+                  </a:solidFill>
+                </a:rPr>
+                <a:t> </a:t>
               </a:r>
               <a:r>
                 <a:rPr lang="en-US" sz="1000" i="1" baseline="30000" dirty="0">
@@ -6023,7 +6053,7 @@
                     <a:schemeClr val="tx1"/>
                   </a:solidFill>
                 </a:rPr>
-                <a:t>7</a:t>
+                <a:t>8</a:t>
               </a:r>
               <a:endParaRPr lang="en-US" sz="1000" dirty="0">
                 <a:solidFill>
@@ -7258,16 +7288,21 @@
                     <a:schemeClr val="tx1"/>
                   </a:solidFill>
                 </a:rPr>
-                <a:t>▼</a:t>
-              </a:r>
-              <a:r>
-                <a:rPr lang="en-US" sz="1000" dirty="0">
-                  <a:solidFill>
-                    <a:schemeClr val="tx1"/>
-                  </a:solidFill>
-                </a:rPr>
-                <a:t>⌀</a:t>
-              </a:r>
+                <a:t>▼R_het_litter </a:t>
+              </a:r>
+              <a:r>
+                <a:rPr lang="en-US" sz="1000" i="1" baseline="30000" dirty="0">
+                  <a:solidFill>
+                    <a:schemeClr val="tx1"/>
+                  </a:solidFill>
+                </a:rPr>
+                <a:t>4,7</a:t>
+              </a:r>
+              <a:endParaRPr lang="en-US" sz="1000" i="1" dirty="0">
+                <a:solidFill>
+                  <a:schemeClr val="tx1"/>
+                </a:solidFill>
+              </a:endParaRPr>
             </a:p>
           </p:txBody>
         </p:sp>

</xml_diff>

<commit_message>
update figure & footnotes
</commit_message>
<xml_diff>
--- a/doc/manuscript/figures_tables/C_pools_fig.pptx
+++ b/doc/manuscript/figures_tables/C_pools_fig.pptx
@@ -508,10 +508,7 @@
           <a:bodyPr/>
           <a:lstStyle/>
           <a:p>
-            <a:r>
-              <a:rPr lang="en-US" dirty="0"/>
-              <a:t>Figure caption in paper has master set of footnotes. The one above may be out of date</a:t>
-            </a:r>
+            <a:endParaRPr lang="en-US" dirty="0"/>
           </a:p>
         </p:txBody>
       </p:sp>
@@ -5129,7 +5126,15 @@
                     <a:schemeClr val="tx1"/>
                   </a:solidFill>
                 </a:rPr>
-                <a:t>ANPP_woody_stem</a:t>
+                <a:t>ANPP_woody_stem </a:t>
+              </a:r>
+              <a:r>
+                <a:rPr lang="en-US" sz="1000" i="1" baseline="30000" dirty="0">
+                  <a:solidFill>
+                    <a:schemeClr val="tx1"/>
+                  </a:solidFill>
+                </a:rPr>
+                <a:t>9</a:t>
               </a:r>
               <a:endParaRPr lang="en-US" sz="1000" dirty="0">
                 <a:solidFill>
@@ -5203,7 +5208,7 @@
                     <a:schemeClr val="tx1"/>
                   </a:solidFill>
                 </a:rPr>
-                <a:t>2,3</a:t>
+                <a:t>2,3,9</a:t>
               </a:r>
               <a:endParaRPr lang="en-US" sz="1000" dirty="0">
                 <a:solidFill>
@@ -5755,8 +5760,8 @@
         </p:nvSpPr>
         <p:spPr>
           <a:xfrm>
-            <a:off x="0" y="7108748"/>
-            <a:ext cx="6769459" cy="1785104"/>
+            <a:off x="44270" y="7802081"/>
+            <a:ext cx="6769459" cy="246221"/>
           </a:xfrm>
           <a:prstGeom prst="rect">
             <a:avLst/>
@@ -5770,95 +5775,8 @@
           <a:lstStyle/>
           <a:p>
             <a:r>
-              <a:rPr lang="en-US" sz="1000" baseline="30000" dirty="0"/>
-              <a:t>1</a:t>
-            </a:r>
-            <a:r>
               <a:rPr lang="en-US" sz="1000" dirty="0"/>
-              <a:t> assumes minimal non-respiratory C fluxes, …. (Chapin et al. 2006)</a:t>
-            </a:r>
-          </a:p>
-          <a:p>
-            <a:r>
-              <a:rPr lang="en-US" sz="1000" baseline="30000" dirty="0"/>
-              <a:t>2 </a:t>
-            </a:r>
-            <a:r>
-              <a:rPr lang="en-US" sz="1000" dirty="0"/>
-              <a:t>assumes that change in foliage biomass is negligible (see note 7).</a:t>
-            </a:r>
-            <a:endParaRPr lang="en-US" sz="1000" baseline="30000" dirty="0"/>
-          </a:p>
-          <a:p>
-            <a:r>
-              <a:rPr lang="en-US" sz="1000" baseline="30000" dirty="0"/>
-              <a:t>3 </a:t>
-            </a:r>
-            <a:r>
-              <a:rPr lang="en-US" sz="1000" dirty="0"/>
-              <a:t>incomplete: excludes large branch fall; also, under IPCC definitions, outflux from </a:t>
-            </a:r>
-            <a:r>
-              <a:rPr lang="en-US" sz="1000" i="1" dirty="0"/>
-              <a:t>biomass_ag </a:t>
-            </a:r>
-            <a:r>
-              <a:rPr lang="en-US" sz="1000" dirty="0"/>
-              <a:t>should include all sizes, influx to </a:t>
-            </a:r>
-            <a:r>
-              <a:rPr lang="en-US" sz="1000" i="1" dirty="0"/>
-              <a:t>deadwood</a:t>
-            </a:r>
-            <a:r>
-              <a:rPr lang="en-US" sz="1000" dirty="0"/>
-              <a:t> should include only above the minimum diameter chosen for dead wood</a:t>
-            </a:r>
-          </a:p>
-          <a:p>
-            <a:r>
-              <a:rPr lang="en-US" sz="1000" baseline="30000" dirty="0"/>
-              <a:t>4 </a:t>
-            </a:r>
-            <a:r>
-              <a:rPr lang="en-US" sz="1000" dirty="0"/>
-              <a:t>incomplete: excludes belowground components </a:t>
-            </a:r>
-          </a:p>
-          <a:p>
-            <a:r>
-              <a:rPr lang="en-US" sz="1000" baseline="30000" dirty="0"/>
-              <a:t>5 </a:t>
-            </a:r>
-            <a:r>
-              <a:rPr lang="en-US" sz="1000" dirty="0"/>
-              <a:t>incomplete: excludes breakage into pieces less than dead wood threshold size</a:t>
-            </a:r>
-          </a:p>
-          <a:p>
-            <a:r>
-              <a:rPr lang="en-US" sz="1000" baseline="30000" dirty="0"/>
-              <a:t>6 </a:t>
-            </a:r>
-            <a:r>
-              <a:rPr lang="en-US" sz="1000" dirty="0"/>
-              <a:t>incomplete: excludes woody_mortality of stems &lt;10 cm DBH, decomposition of dead wood (aboveground and coarse roots) into sizes classified as litter. </a:t>
-            </a:r>
-          </a:p>
-          <a:p>
-            <a:r>
-              <a:rPr lang="en-US" sz="1000" dirty="0"/>
-              <a:t>7 incomplete</a:t>
-            </a:r>
-          </a:p>
-          <a:p>
-            <a:r>
-              <a:rPr lang="en-US" sz="1000" baseline="30000" dirty="0"/>
-              <a:t>8</a:t>
-            </a:r>
-            <a:r>
-              <a:rPr lang="en-US" sz="1000" dirty="0"/>
-              <a:t> foliage production is generally measured by collecting leaf-fall, a method that assumes that the influx = outflux (foliage biomass is roughly constant year-to-year)</a:t>
+              <a:t>For footnotes, see caption in manuscript. </a:t>
             </a:r>
           </a:p>
         </p:txBody>
@@ -5942,20 +5860,12 @@
                 <a:t>▲ </a:t>
               </a:r>
               <a:r>
-                <a:rPr lang="en-US" sz="1000" i="1" dirty="0" err="1">
-                  <a:solidFill>
-                    <a:schemeClr val="tx1"/>
-                  </a:solidFill>
-                </a:rPr>
-                <a:t>ANPP_foliage</a:t>
-              </a:r>
-              <a:r>
                 <a:rPr lang="en-US" sz="1000" i="1" dirty="0">
                   <a:solidFill>
                     <a:schemeClr val="tx1"/>
                   </a:solidFill>
                 </a:rPr>
-                <a:t> </a:t>
+                <a:t>ANPP_foliage </a:t>
               </a:r>
               <a:r>
                 <a:rPr lang="en-US" sz="1000" i="1" baseline="30000" dirty="0">
@@ -6029,23 +5939,7 @@
                     <a:schemeClr val="tx1"/>
                   </a:solidFill>
                 </a:rPr>
-                <a:t>▼ </a:t>
-              </a:r>
-              <a:r>
-                <a:rPr lang="en-US" sz="1000" i="1" dirty="0" err="1">
-                  <a:solidFill>
-                    <a:schemeClr val="tx1"/>
-                  </a:solidFill>
-                </a:rPr>
-                <a:t>ANPP_foliage</a:t>
-              </a:r>
-              <a:r>
-                <a:rPr lang="en-US" sz="1000" i="1" dirty="0">
-                  <a:solidFill>
-                    <a:schemeClr val="tx1"/>
-                  </a:solidFill>
-                </a:rPr>
-                <a:t> </a:t>
+                <a:t>▼ ANPP_foliage </a:t>
               </a:r>
               <a:r>
                 <a:rPr lang="en-US" sz="1000" i="1" baseline="30000" dirty="0">
@@ -7214,7 +7108,7 @@
                     <a:schemeClr val="tx1"/>
                   </a:solidFill>
                 </a:rPr>
-                <a:t>NPP_litter </a:t>
+                <a:t>NPP_litterfall </a:t>
               </a:r>
               <a:r>
                 <a:rPr lang="en-US" sz="1000" i="1" baseline="30000" dirty="0">

</xml_diff>

<commit_message>
update variable mapping figure
</commit_message>
<xml_diff>
--- a/doc/manuscript/figures_tables/C_pools_fig.pptx
+++ b/doc/manuscript/figures_tables/C_pools_fig.pptx
@@ -4059,12 +4059,12 @@
                 <a:t>ANPP_woody </a:t>
               </a:r>
               <a:r>
-                <a:rPr lang="en-US" sz="1000" i="1" baseline="30000" dirty="0">
-                  <a:solidFill>
-                    <a:schemeClr val="tx1"/>
-                  </a:solidFill>
-                </a:rPr>
-                <a:t>1</a:t>
+                <a:rPr lang="en-US" sz="1000" i="1" baseline="30000" dirty="0" err="1">
+                  <a:solidFill>
+                    <a:schemeClr val="tx1"/>
+                  </a:solidFill>
+                </a:rPr>
+                <a:t>a,c</a:t>
               </a:r>
               <a:endParaRPr lang="en-US" sz="1000" dirty="0">
                 <a:solidFill>
@@ -4138,7 +4138,7 @@
                     <a:schemeClr val="tx1"/>
                   </a:solidFill>
                 </a:rPr>
-                <a:t>2</a:t>
+                <a:t>b</a:t>
               </a:r>
               <a:endParaRPr lang="en-US" sz="1000" dirty="0">
                 <a:solidFill>
@@ -4440,8 +4440,21 @@
                     <a:schemeClr val="tx1"/>
                   </a:solidFill>
                 </a:rPr>
-                <a:t>NPP_woody</a:t>
-              </a:r>
+                <a:t>NPP_woody </a:t>
+              </a:r>
+              <a:r>
+                <a:rPr lang="en-US" sz="1000" i="1" baseline="30000" dirty="0" err="1">
+                  <a:solidFill>
+                    <a:schemeClr val="tx1"/>
+                  </a:solidFill>
+                </a:rPr>
+                <a:t>a,c</a:t>
+              </a:r>
+              <a:endParaRPr lang="en-US" sz="1000" i="1" dirty="0">
+                <a:solidFill>
+                  <a:schemeClr val="tx1"/>
+                </a:solidFill>
+              </a:endParaRPr>
             </a:p>
           </p:txBody>
         </p:sp>
@@ -4501,8 +4514,21 @@
                     <a:schemeClr val="tx1"/>
                   </a:solidFill>
                 </a:rPr>
-                <a:t>▼woody.mortality</a:t>
-              </a:r>
+                <a:t>▼woody.mortality </a:t>
+              </a:r>
+              <a:r>
+                <a:rPr lang="en-US" sz="1000" i="1" baseline="30000" dirty="0">
+                  <a:solidFill>
+                    <a:schemeClr val="tx1"/>
+                  </a:solidFill>
+                </a:rPr>
+                <a:t>b</a:t>
+              </a:r>
+              <a:endParaRPr lang="en-US" sz="1000" i="1" dirty="0">
+                <a:solidFill>
+                  <a:schemeClr val="tx1"/>
+                </a:solidFill>
+              </a:endParaRPr>
             </a:p>
           </p:txBody>
         </p:sp>
@@ -4790,12 +4816,12 @@
                 <a:t>woody.mortality </a:t>
               </a:r>
               <a:r>
-                <a:rPr lang="en-US" sz="1000" i="1" baseline="30000" dirty="0">
-                  <a:solidFill>
-                    <a:schemeClr val="tx1"/>
-                  </a:solidFill>
-                </a:rPr>
-                <a:t>2,3</a:t>
+                <a:rPr lang="en-US" sz="1000" i="1" baseline="30000" dirty="0" err="1">
+                  <a:solidFill>
+                    <a:schemeClr val="tx1"/>
+                  </a:solidFill>
+                </a:rPr>
+                <a:t>b,d</a:t>
               </a:r>
               <a:endParaRPr lang="en-US" sz="1000" dirty="0">
                 <a:solidFill>
@@ -4864,12 +4890,12 @@
                 <a:t>▼ R_het_deadwood </a:t>
               </a:r>
               <a:r>
-                <a:rPr lang="en-US" sz="1000" baseline="30000" dirty="0">
-                  <a:solidFill>
-                    <a:schemeClr val="tx1"/>
-                  </a:solidFill>
-                </a:rPr>
-                <a:t>3,4</a:t>
+                <a:rPr lang="en-US" sz="1000" baseline="30000" dirty="0" err="1">
+                  <a:solidFill>
+                    <a:schemeClr val="tx1"/>
+                  </a:solidFill>
+                </a:rPr>
+                <a:t>d,f</a:t>
               </a:r>
               <a:r>
                 <a:rPr lang="en-US" sz="1000" dirty="0">
@@ -4949,12 +4975,12 @@
                 <a:t> delta.deadwood </a:t>
               </a:r>
               <a:r>
-                <a:rPr lang="en-US" sz="1000" baseline="30000" dirty="0">
-                  <a:solidFill>
-                    <a:schemeClr val="tx1"/>
-                  </a:solidFill>
-                </a:rPr>
-                <a:t>3</a:t>
+                <a:rPr lang="en-US" sz="1000" i="1" baseline="30000" dirty="0" err="1">
+                  <a:solidFill>
+                    <a:schemeClr val="tx1"/>
+                  </a:solidFill>
+                </a:rPr>
+                <a:t>d,e</a:t>
               </a:r>
               <a:endParaRPr lang="en-US" sz="1000" dirty="0">
                 <a:solidFill>
@@ -5023,12 +5049,12 @@
                 <a:t>deadwood </a:t>
               </a:r>
               <a:r>
-                <a:rPr lang="en-US" sz="1000" i="1" baseline="30000" dirty="0">
-                  <a:solidFill>
-                    <a:schemeClr val="tx1"/>
-                  </a:solidFill>
-                </a:rPr>
-                <a:t>3</a:t>
+                <a:rPr lang="en-US" sz="1000" i="1" baseline="30000" dirty="0" err="1">
+                  <a:solidFill>
+                    <a:schemeClr val="tx1"/>
+                  </a:solidFill>
+                </a:rPr>
+                <a:t>d,e</a:t>
               </a:r>
               <a:endParaRPr lang="en-US" sz="1000" i="1" dirty="0">
                 <a:solidFill>
@@ -5232,7 +5258,7 @@
                     <a:schemeClr val="tx1"/>
                   </a:solidFill>
                 </a:rPr>
-                <a:t>7</a:t>
+                <a:t>c</a:t>
               </a:r>
               <a:endParaRPr lang="en-US" sz="1000" dirty="0">
                 <a:solidFill>
@@ -5306,7 +5332,7 @@
                     <a:schemeClr val="tx1"/>
                   </a:solidFill>
                 </a:rPr>
-                <a:t>7</a:t>
+                <a:t>c</a:t>
               </a:r>
               <a:endParaRPr lang="en-US" sz="1000" dirty="0">
                 <a:solidFill>
@@ -6065,12 +6091,12 @@
                 <a:t>NPP_litterfall </a:t>
               </a:r>
               <a:r>
-                <a:rPr lang="en-US" sz="1000" i="1" baseline="30000" dirty="0">
-                  <a:solidFill>
-                    <a:schemeClr val="tx1"/>
-                  </a:solidFill>
-                </a:rPr>
-                <a:t>5</a:t>
+                <a:rPr lang="en-US" sz="1000" baseline="30000" dirty="0" err="1">
+                  <a:solidFill>
+                    <a:schemeClr val="tx1"/>
+                  </a:solidFill>
+                </a:rPr>
+                <a:t>b,f</a:t>
               </a:r>
               <a:endParaRPr lang="en-US" sz="1000" dirty="0">
                 <a:solidFill>
@@ -6136,17 +6162,33 @@
                     <a:schemeClr val="tx1"/>
                   </a:solidFill>
                 </a:rPr>
-                <a:t>▼R_het_litter </a:t>
-              </a:r>
-              <a:r>
-                <a:rPr lang="en-US" sz="1000" i="1" baseline="30000" dirty="0">
-                  <a:solidFill>
-                    <a:schemeClr val="tx1"/>
-                  </a:solidFill>
-                </a:rPr>
-                <a:t>3,6</a:t>
-              </a:r>
-              <a:endParaRPr lang="en-US" sz="1000" i="1" dirty="0">
+                <a:t>▼R_het_</a:t>
+              </a:r>
+              <a:r>
+                <a:rPr lang="en-US" sz="1000" i="1">
+                  <a:solidFill>
+                    <a:schemeClr val="tx1"/>
+                  </a:solidFill>
+                </a:rPr>
+                <a:t>litter </a:t>
+              </a:r>
+              <a:r>
+                <a:rPr lang="en-US" sz="1000" baseline="30000">
+                  <a:solidFill>
+                    <a:schemeClr val="tx1"/>
+                  </a:solidFill>
+                </a:rPr>
+                <a:t>b,f,</a:t>
+              </a:r>
+              <a:r>
+                <a:rPr lang="en-US" sz="1000" baseline="30000" dirty="0" err="1">
+                  <a:solidFill>
+                    <a:schemeClr val="tx1"/>
+                  </a:solidFill>
+                </a:rPr>
+                <a:t>g</a:t>
+              </a:r>
+              <a:endParaRPr lang="en-US" sz="1000" dirty="0">
                 <a:solidFill>
                   <a:schemeClr val="tx1"/>
                 </a:solidFill>
@@ -6221,12 +6263,12 @@
                 <a:t> delta.O.horizon </a:t>
               </a:r>
               <a:r>
-                <a:rPr lang="en-US" sz="1000" baseline="30000" dirty="0">
-                  <a:solidFill>
-                    <a:schemeClr val="tx1"/>
-                  </a:solidFill>
-                </a:rPr>
-                <a:t>3</a:t>
+                <a:rPr lang="en-US" sz="1000" baseline="30000" dirty="0" err="1">
+                  <a:solidFill>
+                    <a:schemeClr val="tx1"/>
+                  </a:solidFill>
+                </a:rPr>
+                <a:t>d,e</a:t>
               </a:r>
               <a:endParaRPr lang="en-US" sz="1000" dirty="0">
                 <a:solidFill>
@@ -6295,12 +6337,12 @@
                 <a:t>O.horizon </a:t>
               </a:r>
               <a:r>
-                <a:rPr lang="en-US" sz="1000" i="1" baseline="30000" dirty="0">
-                  <a:solidFill>
-                    <a:schemeClr val="tx1"/>
-                  </a:solidFill>
-                </a:rPr>
-                <a:t>3</a:t>
+                <a:rPr lang="en-US" sz="1000" i="1" baseline="30000" dirty="0" err="1">
+                  <a:solidFill>
+                    <a:schemeClr val="tx1"/>
+                  </a:solidFill>
+                </a:rPr>
+                <a:t>d,e</a:t>
               </a:r>
               <a:endParaRPr lang="en-US" sz="1000" i="1" dirty="0">
                 <a:solidFill>
@@ -7903,7 +7945,7 @@
                       <a:schemeClr val="tx1"/>
                     </a:solidFill>
                   </a:rPr>
-                  <a:t>8</a:t>
+                  <a:t>a</a:t>
                 </a:r>
                 <a:endParaRPr lang="en-US" sz="1000" dirty="0">
                   <a:solidFill>
@@ -7977,7 +8019,7 @@
                       <a:schemeClr val="tx1"/>
                     </a:solidFill>
                   </a:rPr>
-                  <a:t>1,2,8</a:t>
+                  <a:t>b</a:t>
                 </a:r>
                 <a:endParaRPr lang="en-US" sz="1000" dirty="0">
                   <a:solidFill>
@@ -8177,15 +8219,7 @@
                     <a:schemeClr val="tx1"/>
                   </a:solidFill>
                 </a:rPr>
-                <a:t> delta.agb </a:t>
-              </a:r>
-              <a:r>
-                <a:rPr lang="en-US" sz="1000" i="1" baseline="30000" dirty="0">
-                  <a:solidFill>
-                    <a:schemeClr val="tx1"/>
-                  </a:solidFill>
-                </a:rPr>
-                <a:t>1</a:t>
+                <a:t> delta.agb</a:t>
               </a:r>
               <a:endParaRPr lang="en-US" sz="1000" dirty="0">
                 <a:solidFill>

</xml_diff>